<commit_message>
Update theme-color and favicon
</commit_message>
<xml_diff>
--- a/assets/img/favicon.pptx
+++ b/assets/img/favicon.pptx
@@ -6,9 +6,10 @@
   </p:sldMasterIdLst>
   <p:sldIdLst>
     <p:sldId id="258" r:id="rId2"/>
-    <p:sldId id="259" r:id="rId3"/>
-    <p:sldId id="257" r:id="rId4"/>
-    <p:sldId id="256" r:id="rId5"/>
+    <p:sldId id="260" r:id="rId3"/>
+    <p:sldId id="259" r:id="rId4"/>
+    <p:sldId id="257" r:id="rId5"/>
+    <p:sldId id="256" r:id="rId6"/>
   </p:sldIdLst>
   <p:sldSz cx="12192000" cy="6858000"/>
   <p:notesSz cx="6858000" cy="9144000"/>
@@ -273,7 +274,7 @@
           <a:p>
             <a:fld id="{A86F15C1-A5AF-144C-8F8E-B816AAE2DEC0}" type="datetimeFigureOut">
               <a:rPr kumimoji="1" lang="ko-KR" altLang="en-US" smtClean="0"/>
-              <a:t>2024. 2. 22.</a:t>
+              <a:t>2024. 2. 29.</a:t>
             </a:fld>
             <a:endParaRPr kumimoji="1" lang="ko-KR" altLang="en-US"/>
           </a:p>
@@ -471,7 +472,7 @@
           <a:p>
             <a:fld id="{A86F15C1-A5AF-144C-8F8E-B816AAE2DEC0}" type="datetimeFigureOut">
               <a:rPr kumimoji="1" lang="ko-KR" altLang="en-US" smtClean="0"/>
-              <a:t>2024. 2. 22.</a:t>
+              <a:t>2024. 2. 29.</a:t>
             </a:fld>
             <a:endParaRPr kumimoji="1" lang="ko-KR" altLang="en-US"/>
           </a:p>
@@ -679,7 +680,7 @@
           <a:p>
             <a:fld id="{A86F15C1-A5AF-144C-8F8E-B816AAE2DEC0}" type="datetimeFigureOut">
               <a:rPr kumimoji="1" lang="ko-KR" altLang="en-US" smtClean="0"/>
-              <a:t>2024. 2. 22.</a:t>
+              <a:t>2024. 2. 29.</a:t>
             </a:fld>
             <a:endParaRPr kumimoji="1" lang="ko-KR" altLang="en-US"/>
           </a:p>
@@ -877,7 +878,7 @@
           <a:p>
             <a:fld id="{A86F15C1-A5AF-144C-8F8E-B816AAE2DEC0}" type="datetimeFigureOut">
               <a:rPr kumimoji="1" lang="ko-KR" altLang="en-US" smtClean="0"/>
-              <a:t>2024. 2. 22.</a:t>
+              <a:t>2024. 2. 29.</a:t>
             </a:fld>
             <a:endParaRPr kumimoji="1" lang="ko-KR" altLang="en-US"/>
           </a:p>
@@ -1152,7 +1153,7 @@
           <a:p>
             <a:fld id="{A86F15C1-A5AF-144C-8F8E-B816AAE2DEC0}" type="datetimeFigureOut">
               <a:rPr kumimoji="1" lang="ko-KR" altLang="en-US" smtClean="0"/>
-              <a:t>2024. 2. 22.</a:t>
+              <a:t>2024. 2. 29.</a:t>
             </a:fld>
             <a:endParaRPr kumimoji="1" lang="ko-KR" altLang="en-US"/>
           </a:p>
@@ -1417,7 +1418,7 @@
           <a:p>
             <a:fld id="{A86F15C1-A5AF-144C-8F8E-B816AAE2DEC0}" type="datetimeFigureOut">
               <a:rPr kumimoji="1" lang="ko-KR" altLang="en-US" smtClean="0"/>
-              <a:t>2024. 2. 22.</a:t>
+              <a:t>2024. 2. 29.</a:t>
             </a:fld>
             <a:endParaRPr kumimoji="1" lang="ko-KR" altLang="en-US"/>
           </a:p>
@@ -1829,7 +1830,7 @@
           <a:p>
             <a:fld id="{A86F15C1-A5AF-144C-8F8E-B816AAE2DEC0}" type="datetimeFigureOut">
               <a:rPr kumimoji="1" lang="ko-KR" altLang="en-US" smtClean="0"/>
-              <a:t>2024. 2. 22.</a:t>
+              <a:t>2024. 2. 29.</a:t>
             </a:fld>
             <a:endParaRPr kumimoji="1" lang="ko-KR" altLang="en-US"/>
           </a:p>
@@ -1970,7 +1971,7 @@
           <a:p>
             <a:fld id="{A86F15C1-A5AF-144C-8F8E-B816AAE2DEC0}" type="datetimeFigureOut">
               <a:rPr kumimoji="1" lang="ko-KR" altLang="en-US" smtClean="0"/>
-              <a:t>2024. 2. 22.</a:t>
+              <a:t>2024. 2. 29.</a:t>
             </a:fld>
             <a:endParaRPr kumimoji="1" lang="ko-KR" altLang="en-US"/>
           </a:p>
@@ -2083,7 +2084,7 @@
           <a:p>
             <a:fld id="{A86F15C1-A5AF-144C-8F8E-B816AAE2DEC0}" type="datetimeFigureOut">
               <a:rPr kumimoji="1" lang="ko-KR" altLang="en-US" smtClean="0"/>
-              <a:t>2024. 2. 22.</a:t>
+              <a:t>2024. 2. 29.</a:t>
             </a:fld>
             <a:endParaRPr kumimoji="1" lang="ko-KR" altLang="en-US"/>
           </a:p>
@@ -2394,7 +2395,7 @@
           <a:p>
             <a:fld id="{A86F15C1-A5AF-144C-8F8E-B816AAE2DEC0}" type="datetimeFigureOut">
               <a:rPr kumimoji="1" lang="ko-KR" altLang="en-US" smtClean="0"/>
-              <a:t>2024. 2. 22.</a:t>
+              <a:t>2024. 2. 29.</a:t>
             </a:fld>
             <a:endParaRPr kumimoji="1" lang="ko-KR" altLang="en-US"/>
           </a:p>
@@ -2682,7 +2683,7 @@
           <a:p>
             <a:fld id="{A86F15C1-A5AF-144C-8F8E-B816AAE2DEC0}" type="datetimeFigureOut">
               <a:rPr kumimoji="1" lang="ko-KR" altLang="en-US" smtClean="0"/>
-              <a:t>2024. 2. 22.</a:t>
+              <a:t>2024. 2. 29.</a:t>
             </a:fld>
             <a:endParaRPr kumimoji="1" lang="ko-KR" altLang="en-US"/>
           </a:p>
@@ -2923,7 +2924,7 @@
           <a:p>
             <a:fld id="{A86F15C1-A5AF-144C-8F8E-B816AAE2DEC0}" type="datetimeFigureOut">
               <a:rPr kumimoji="1" lang="ko-KR" altLang="en-US" smtClean="0"/>
-              <a:t>2024. 2. 22.</a:t>
+              <a:t>2024. 2. 29.</a:t>
             </a:fld>
             <a:endParaRPr kumimoji="1" lang="ko-KR" altLang="en-US"/>
           </a:p>
@@ -3340,6 +3341,198 @@
           <a:chExt cx="0" cy="0"/>
         </a:xfrm>
       </p:grpSpPr>
+      <p:sp>
+        <p:nvSpPr>
+          <p:cNvPr id="5" name="타원 4">
+            <a:extLst>
+              <a:ext uri="{FF2B5EF4-FFF2-40B4-BE49-F238E27FC236}">
+                <a16:creationId xmlns:a16="http://schemas.microsoft.com/office/drawing/2014/main" id="{6DBE8BD5-79B3-1BA8-297F-E6037AFC92C2}"/>
+              </a:ext>
+            </a:extLst>
+          </p:cNvPr>
+          <p:cNvSpPr/>
+          <p:nvPr/>
+        </p:nvSpPr>
+        <p:spPr>
+          <a:xfrm>
+            <a:off x="1934194" y="1663638"/>
+            <a:ext cx="3073977" cy="3073977"/>
+          </a:xfrm>
+          <a:prstGeom prst="ellipse">
+            <a:avLst/>
+          </a:prstGeom>
+          <a:solidFill>
+            <a:srgbClr val="F29105"/>
+          </a:solidFill>
+          <a:ln>
+            <a:noFill/>
+          </a:ln>
+        </p:spPr>
+        <p:style>
+          <a:lnRef idx="2">
+            <a:schemeClr val="accent1">
+              <a:shade val="15000"/>
+            </a:schemeClr>
+          </a:lnRef>
+          <a:fillRef idx="1">
+            <a:schemeClr val="accent1"/>
+          </a:fillRef>
+          <a:effectRef idx="0">
+            <a:schemeClr val="accent1"/>
+          </a:effectRef>
+          <a:fontRef idx="minor">
+            <a:schemeClr val="lt1"/>
+          </a:fontRef>
+        </p:style>
+        <p:txBody>
+          <a:bodyPr rtlCol="0" anchor="ctr"/>
+          <a:lstStyle/>
+          <a:p>
+            <a:pPr marL="0" marR="0" lvl="0" indent="0" algn="ctr" defTabSz="914400" rtl="0" eaLnBrk="1" fontAlgn="auto" latinLnBrk="1" hangingPunct="1">
+              <a:lnSpc>
+                <a:spcPct val="100000"/>
+              </a:lnSpc>
+              <a:spcBef>
+                <a:spcPts val="0"/>
+              </a:spcBef>
+              <a:spcAft>
+                <a:spcPts val="0"/>
+              </a:spcAft>
+              <a:buClrTx/>
+              <a:buSzTx/>
+              <a:buFontTx/>
+              <a:buNone/>
+              <a:tabLst/>
+              <a:defRPr/>
+            </a:pPr>
+            <a:endParaRPr kumimoji="1" lang="ko-KR" altLang="en-US" sz="1800" b="0" i="0" u="none" strike="noStrike" kern="1200" cap="none" spc="0" normalizeH="0" baseline="0" noProof="0" dirty="0">
+              <a:ln>
+                <a:noFill/>
+              </a:ln>
+              <a:solidFill>
+                <a:prstClr val="white"/>
+              </a:solidFill>
+              <a:effectLst/>
+              <a:uLnTx/>
+              <a:uFillTx/>
+              <a:latin typeface="맑은 고딕" panose="02110004020202020204"/>
+              <a:ea typeface="맑은 고딕" panose="020B0503020000020004" pitchFamily="34" charset="-127"/>
+              <a:cs typeface="+mn-cs"/>
+            </a:endParaRPr>
+          </a:p>
+        </p:txBody>
+      </p:sp>
+      <p:sp>
+        <p:nvSpPr>
+          <p:cNvPr id="7" name="타원 6">
+            <a:extLst>
+              <a:ext uri="{FF2B5EF4-FFF2-40B4-BE49-F238E27FC236}">
+                <a16:creationId xmlns:a16="http://schemas.microsoft.com/office/drawing/2014/main" id="{193B6F19-3515-AB00-BEED-A2B8F64A98D4}"/>
+              </a:ext>
+            </a:extLst>
+          </p:cNvPr>
+          <p:cNvSpPr/>
+          <p:nvPr/>
+        </p:nvSpPr>
+        <p:spPr>
+          <a:xfrm>
+            <a:off x="5417622" y="1663637"/>
+            <a:ext cx="3073977" cy="3073977"/>
+          </a:xfrm>
+          <a:prstGeom prst="ellipse">
+            <a:avLst/>
+          </a:prstGeom>
+          <a:solidFill>
+            <a:srgbClr val="990000"/>
+          </a:solidFill>
+          <a:ln>
+            <a:noFill/>
+          </a:ln>
+        </p:spPr>
+        <p:style>
+          <a:lnRef idx="2">
+            <a:schemeClr val="accent1">
+              <a:shade val="15000"/>
+            </a:schemeClr>
+          </a:lnRef>
+          <a:fillRef idx="1">
+            <a:schemeClr val="accent1"/>
+          </a:fillRef>
+          <a:effectRef idx="0">
+            <a:schemeClr val="accent1"/>
+          </a:effectRef>
+          <a:fontRef idx="minor">
+            <a:schemeClr val="lt1"/>
+          </a:fontRef>
+        </p:style>
+        <p:txBody>
+          <a:bodyPr rtlCol="0" anchor="ctr"/>
+          <a:lstStyle/>
+          <a:p>
+            <a:pPr marL="0" marR="0" lvl="0" indent="0" algn="ctr" defTabSz="914400" rtl="0" eaLnBrk="1" fontAlgn="auto" latinLnBrk="1" hangingPunct="1">
+              <a:lnSpc>
+                <a:spcPct val="100000"/>
+              </a:lnSpc>
+              <a:spcBef>
+                <a:spcPts val="0"/>
+              </a:spcBef>
+              <a:spcAft>
+                <a:spcPts val="0"/>
+              </a:spcAft>
+              <a:buClrTx/>
+              <a:buSzTx/>
+              <a:buFontTx/>
+              <a:buNone/>
+              <a:tabLst/>
+              <a:defRPr/>
+            </a:pPr>
+            <a:endParaRPr kumimoji="1" lang="ko-KR" altLang="en-US" sz="1800" b="0" i="0" u="none" strike="noStrike" kern="1200" cap="none" spc="0" normalizeH="0" baseline="0" noProof="0" dirty="0">
+              <a:ln>
+                <a:noFill/>
+              </a:ln>
+              <a:solidFill>
+                <a:prstClr val="white"/>
+              </a:solidFill>
+              <a:effectLst/>
+              <a:uLnTx/>
+              <a:uFillTx/>
+              <a:latin typeface="맑은 고딕" panose="02110004020202020204"/>
+              <a:ea typeface="맑은 고딕" panose="020B0503020000020004" pitchFamily="34" charset="-127"/>
+              <a:cs typeface="+mn-cs"/>
+            </a:endParaRPr>
+          </a:p>
+        </p:txBody>
+      </p:sp>
+    </p:spTree>
+    <p:extLst>
+      <p:ext uri="{BB962C8B-B14F-4D97-AF65-F5344CB8AC3E}">
+        <p14:creationId xmlns:p14="http://schemas.microsoft.com/office/powerpoint/2010/main" val="3253071500"/>
+      </p:ext>
+    </p:extLst>
+  </p:cSld>
+  <p:clrMapOvr>
+    <a:masterClrMapping/>
+  </p:clrMapOvr>
+</p:sld>
+</file>
+
+<file path=ppt/slides/slide2.xml><?xml version="1.0" encoding="utf-8"?>
+<p:sld xmlns:a="http://schemas.openxmlformats.org/drawingml/2006/main" xmlns:r="http://schemas.openxmlformats.org/officeDocument/2006/relationships" xmlns:p="http://schemas.openxmlformats.org/presentationml/2006/main">
+  <p:cSld>
+    <p:spTree>
+      <p:nvGrpSpPr>
+        <p:cNvPr id="1" name=""/>
+        <p:cNvGrpSpPr/>
+        <p:nvPr/>
+      </p:nvGrpSpPr>
+      <p:grpSpPr>
+        <a:xfrm>
+          <a:off x="0" y="0"/>
+          <a:ext cx="0" cy="0"/>
+          <a:chOff x="0" y="0"/>
+          <a:chExt cx="0" cy="0"/>
+        </a:xfrm>
+      </p:grpSpPr>
       <p:grpSp>
         <p:nvGrpSpPr>
           <p:cNvPr id="13" name="그룹 12">
@@ -3581,7 +3774,7 @@
     </p:spTree>
     <p:extLst>
       <p:ext uri="{BB962C8B-B14F-4D97-AF65-F5344CB8AC3E}">
-        <p14:creationId xmlns:p14="http://schemas.microsoft.com/office/powerpoint/2010/main" val="3253071500"/>
+        <p14:creationId xmlns:p14="http://schemas.microsoft.com/office/powerpoint/2010/main" val="588812455"/>
       </p:ext>
     </p:extLst>
   </p:cSld>
@@ -3591,7 +3784,7 @@
 </p:sld>
 </file>
 
-<file path=ppt/slides/slide2.xml><?xml version="1.0" encoding="utf-8"?>
+<file path=ppt/slides/slide3.xml><?xml version="1.0" encoding="utf-8"?>
 <p:sld xmlns:a="http://schemas.openxmlformats.org/drawingml/2006/main" xmlns:r="http://schemas.openxmlformats.org/officeDocument/2006/relationships" xmlns:p="http://schemas.openxmlformats.org/presentationml/2006/main">
   <p:cSld>
     <p:spTree>
@@ -3910,7 +4103,7 @@
 </p:sld>
 </file>
 
-<file path=ppt/slides/slide3.xml><?xml version="1.0" encoding="utf-8"?>
+<file path=ppt/slides/slide4.xml><?xml version="1.0" encoding="utf-8"?>
 <p:sld xmlns:a="http://schemas.openxmlformats.org/drawingml/2006/main" xmlns:r="http://schemas.openxmlformats.org/officeDocument/2006/relationships" xmlns:p="http://schemas.openxmlformats.org/presentationml/2006/main">
   <p:cSld>
     <p:spTree>
@@ -4127,7 +4320,7 @@
 </p:sld>
 </file>
 
-<file path=ppt/slides/slide4.xml><?xml version="1.0" encoding="utf-8"?>
+<file path=ppt/slides/slide5.xml><?xml version="1.0" encoding="utf-8"?>
 <p:sld xmlns:a="http://schemas.openxmlformats.org/drawingml/2006/main" xmlns:r="http://schemas.openxmlformats.org/officeDocument/2006/relationships" xmlns:p="http://schemas.openxmlformats.org/presentationml/2006/main">
   <p:cSld>
     <p:spTree>

</xml_diff>

<commit_message>
Deploying to gh-pages from @ abman23/abman23.github.io@b2c96a17dbdf3ccceea6c9e7218dc3ffb247c6b9 🚀
</commit_message>
<xml_diff>
--- a/assets/img/favicon.pptx
+++ b/assets/img/favicon.pptx
@@ -6,10 +6,12 @@
   </p:sldMasterIdLst>
   <p:sldIdLst>
     <p:sldId id="258" r:id="rId2"/>
-    <p:sldId id="260" r:id="rId3"/>
-    <p:sldId id="259" r:id="rId4"/>
-    <p:sldId id="257" r:id="rId5"/>
-    <p:sldId id="256" r:id="rId6"/>
+    <p:sldId id="264" r:id="rId3"/>
+    <p:sldId id="263" r:id="rId4"/>
+    <p:sldId id="262" r:id="rId5"/>
+    <p:sldId id="261" r:id="rId6"/>
+    <p:sldId id="260" r:id="rId7"/>
+    <p:sldId id="256" r:id="rId8"/>
   </p:sldIdLst>
   <p:sldSz cx="12192000" cy="6858000"/>
   <p:notesSz cx="6858000" cy="9144000"/>
@@ -116,7 +118,7 @@
             <a:srgbClr val="A4A3A4"/>
           </p15:clr>
         </p15:guide>
-        <p15:guide id="2" pos="3863" userDrawn="1">
+        <p15:guide id="2" pos="1440" userDrawn="1">
           <p15:clr>
             <a:srgbClr val="A4A3A4"/>
           </p15:clr>
@@ -274,7 +276,7 @@
           <a:p>
             <a:fld id="{A86F15C1-A5AF-144C-8F8E-B816AAE2DEC0}" type="datetimeFigureOut">
               <a:rPr kumimoji="1" lang="ko-KR" altLang="en-US" smtClean="0"/>
-              <a:t>2024. 2. 29.</a:t>
+              <a:t>2024. 11. 27.</a:t>
             </a:fld>
             <a:endParaRPr kumimoji="1" lang="ko-KR" altLang="en-US"/>
           </a:p>
@@ -472,7 +474,7 @@
           <a:p>
             <a:fld id="{A86F15C1-A5AF-144C-8F8E-B816AAE2DEC0}" type="datetimeFigureOut">
               <a:rPr kumimoji="1" lang="ko-KR" altLang="en-US" smtClean="0"/>
-              <a:t>2024. 2. 29.</a:t>
+              <a:t>2024. 11. 27.</a:t>
             </a:fld>
             <a:endParaRPr kumimoji="1" lang="ko-KR" altLang="en-US"/>
           </a:p>
@@ -680,7 +682,7 @@
           <a:p>
             <a:fld id="{A86F15C1-A5AF-144C-8F8E-B816AAE2DEC0}" type="datetimeFigureOut">
               <a:rPr kumimoji="1" lang="ko-KR" altLang="en-US" smtClean="0"/>
-              <a:t>2024. 2. 29.</a:t>
+              <a:t>2024. 11. 27.</a:t>
             </a:fld>
             <a:endParaRPr kumimoji="1" lang="ko-KR" altLang="en-US"/>
           </a:p>
@@ -878,7 +880,7 @@
           <a:p>
             <a:fld id="{A86F15C1-A5AF-144C-8F8E-B816AAE2DEC0}" type="datetimeFigureOut">
               <a:rPr kumimoji="1" lang="ko-KR" altLang="en-US" smtClean="0"/>
-              <a:t>2024. 2. 29.</a:t>
+              <a:t>2024. 11. 27.</a:t>
             </a:fld>
             <a:endParaRPr kumimoji="1" lang="ko-KR" altLang="en-US"/>
           </a:p>
@@ -1153,7 +1155,7 @@
           <a:p>
             <a:fld id="{A86F15C1-A5AF-144C-8F8E-B816AAE2DEC0}" type="datetimeFigureOut">
               <a:rPr kumimoji="1" lang="ko-KR" altLang="en-US" smtClean="0"/>
-              <a:t>2024. 2. 29.</a:t>
+              <a:t>2024. 11. 27.</a:t>
             </a:fld>
             <a:endParaRPr kumimoji="1" lang="ko-KR" altLang="en-US"/>
           </a:p>
@@ -1418,7 +1420,7 @@
           <a:p>
             <a:fld id="{A86F15C1-A5AF-144C-8F8E-B816AAE2DEC0}" type="datetimeFigureOut">
               <a:rPr kumimoji="1" lang="ko-KR" altLang="en-US" smtClean="0"/>
-              <a:t>2024. 2. 29.</a:t>
+              <a:t>2024. 11. 27.</a:t>
             </a:fld>
             <a:endParaRPr kumimoji="1" lang="ko-KR" altLang="en-US"/>
           </a:p>
@@ -1830,7 +1832,7 @@
           <a:p>
             <a:fld id="{A86F15C1-A5AF-144C-8F8E-B816AAE2DEC0}" type="datetimeFigureOut">
               <a:rPr kumimoji="1" lang="ko-KR" altLang="en-US" smtClean="0"/>
-              <a:t>2024. 2. 29.</a:t>
+              <a:t>2024. 11. 27.</a:t>
             </a:fld>
             <a:endParaRPr kumimoji="1" lang="ko-KR" altLang="en-US"/>
           </a:p>
@@ -1971,7 +1973,7 @@
           <a:p>
             <a:fld id="{A86F15C1-A5AF-144C-8F8E-B816AAE2DEC0}" type="datetimeFigureOut">
               <a:rPr kumimoji="1" lang="ko-KR" altLang="en-US" smtClean="0"/>
-              <a:t>2024. 2. 29.</a:t>
+              <a:t>2024. 11. 27.</a:t>
             </a:fld>
             <a:endParaRPr kumimoji="1" lang="ko-KR" altLang="en-US"/>
           </a:p>
@@ -2084,7 +2086,7 @@
           <a:p>
             <a:fld id="{A86F15C1-A5AF-144C-8F8E-B816AAE2DEC0}" type="datetimeFigureOut">
               <a:rPr kumimoji="1" lang="ko-KR" altLang="en-US" smtClean="0"/>
-              <a:t>2024. 2. 29.</a:t>
+              <a:t>2024. 11. 27.</a:t>
             </a:fld>
             <a:endParaRPr kumimoji="1" lang="ko-KR" altLang="en-US"/>
           </a:p>
@@ -2395,7 +2397,7 @@
           <a:p>
             <a:fld id="{A86F15C1-A5AF-144C-8F8E-B816AAE2DEC0}" type="datetimeFigureOut">
               <a:rPr kumimoji="1" lang="ko-KR" altLang="en-US" smtClean="0"/>
-              <a:t>2024. 2. 29.</a:t>
+              <a:t>2024. 11. 27.</a:t>
             </a:fld>
             <a:endParaRPr kumimoji="1" lang="ko-KR" altLang="en-US"/>
           </a:p>
@@ -2683,7 +2685,7 @@
           <a:p>
             <a:fld id="{A86F15C1-A5AF-144C-8F8E-B816AAE2DEC0}" type="datetimeFigureOut">
               <a:rPr kumimoji="1" lang="ko-KR" altLang="en-US" smtClean="0"/>
-              <a:t>2024. 2. 29.</a:t>
+              <a:t>2024. 11. 27.</a:t>
             </a:fld>
             <a:endParaRPr kumimoji="1" lang="ko-KR" altLang="en-US"/>
           </a:p>
@@ -2924,7 +2926,7 @@
           <a:p>
             <a:fld id="{A86F15C1-A5AF-144C-8F8E-B816AAE2DEC0}" type="datetimeFigureOut">
               <a:rPr kumimoji="1" lang="ko-KR" altLang="en-US" smtClean="0"/>
-              <a:t>2024. 2. 29.</a:t>
+              <a:t>2024. 11. 27.</a:t>
             </a:fld>
             <a:endParaRPr kumimoji="1" lang="ko-KR" altLang="en-US"/>
           </a:p>
@@ -3341,12 +3343,972 @@
           <a:chExt cx="0" cy="0"/>
         </a:xfrm>
       </p:grpSpPr>
+      <p:pic>
+        <p:nvPicPr>
+          <p:cNvPr id="23" name="Picture 22">
+            <a:extLst>
+              <a:ext uri="{FF2B5EF4-FFF2-40B4-BE49-F238E27FC236}">
+                <a16:creationId xmlns:a16="http://schemas.microsoft.com/office/drawing/2014/main" id="{B6F02111-B9F2-CDD2-2B45-BFDA3183EE8D}"/>
+              </a:ext>
+            </a:extLst>
+          </p:cNvPr>
+          <p:cNvPicPr>
+            <a:picLocks noChangeAspect="1"/>
+          </p:cNvPicPr>
+          <p:nvPr/>
+        </p:nvPicPr>
+        <p:blipFill rotWithShape="1">
+          <a:blip r:embed="rId2"/>
+          <a:srcRect l="14560" t="11919" r="9801" b="23955"/>
+          <a:stretch/>
+        </p:blipFill>
+        <p:spPr>
+          <a:xfrm>
+            <a:off x="2804217" y="385022"/>
+            <a:ext cx="5990312" cy="6014931"/>
+          </a:xfrm>
+          <a:prstGeom prst="rect">
+            <a:avLst/>
+          </a:prstGeom>
+        </p:spPr>
+      </p:pic>
+    </p:spTree>
+    <p:extLst>
+      <p:ext uri="{BB962C8B-B14F-4D97-AF65-F5344CB8AC3E}">
+        <p14:creationId xmlns:p14="http://schemas.microsoft.com/office/powerpoint/2010/main" val="3253071500"/>
+      </p:ext>
+    </p:extLst>
+  </p:cSld>
+  <p:clrMapOvr>
+    <a:masterClrMapping/>
+  </p:clrMapOvr>
+</p:sld>
+</file>
+
+<file path=ppt/slides/slide2.xml><?xml version="1.0" encoding="utf-8"?>
+<p:sld xmlns:a="http://schemas.openxmlformats.org/drawingml/2006/main" xmlns:r="http://schemas.openxmlformats.org/officeDocument/2006/relationships" xmlns:p="http://schemas.openxmlformats.org/presentationml/2006/main">
+  <p:cSld>
+    <p:spTree>
+      <p:nvGrpSpPr>
+        <p:cNvPr id="1" name="">
+          <a:extLst>
+            <a:ext uri="{FF2B5EF4-FFF2-40B4-BE49-F238E27FC236}">
+              <a16:creationId xmlns:a16="http://schemas.microsoft.com/office/drawing/2014/main" id="{03677D69-8274-423B-D21B-FF4D2DA1B396}"/>
+            </a:ext>
+          </a:extLst>
+        </p:cNvPr>
+        <p:cNvGrpSpPr/>
+        <p:nvPr/>
+      </p:nvGrpSpPr>
+      <p:grpSpPr>
+        <a:xfrm>
+          <a:off x="0" y="0"/>
+          <a:ext cx="0" cy="0"/>
+          <a:chOff x="0" y="0"/>
+          <a:chExt cx="0" cy="0"/>
+        </a:xfrm>
+      </p:grpSpPr>
+      <p:pic>
+        <p:nvPicPr>
+          <p:cNvPr id="23" name="Picture 22">
+            <a:extLst>
+              <a:ext uri="{FF2B5EF4-FFF2-40B4-BE49-F238E27FC236}">
+                <a16:creationId xmlns:a16="http://schemas.microsoft.com/office/drawing/2014/main" id="{8ECFA50C-0D13-2377-8C31-48DE04D45E8F}"/>
+              </a:ext>
+            </a:extLst>
+          </p:cNvPr>
+          <p:cNvPicPr>
+            <a:picLocks noChangeAspect="1"/>
+          </p:cNvPicPr>
+          <p:nvPr/>
+        </p:nvPicPr>
+        <p:blipFill rotWithShape="1">
+          <a:blip r:embed="rId2"/>
+          <a:srcRect l="14560" t="11919" r="9801" b="23955"/>
+          <a:stretch/>
+        </p:blipFill>
+        <p:spPr>
+          <a:xfrm>
+            <a:off x="2804217" y="385022"/>
+            <a:ext cx="5990312" cy="6014931"/>
+          </a:xfrm>
+          <a:prstGeom prst="rect">
+            <a:avLst/>
+          </a:prstGeom>
+        </p:spPr>
+      </p:pic>
+    </p:spTree>
+    <p:extLst>
+      <p:ext uri="{BB962C8B-B14F-4D97-AF65-F5344CB8AC3E}">
+        <p14:creationId xmlns:p14="http://schemas.microsoft.com/office/powerpoint/2010/main" val="3137589056"/>
+      </p:ext>
+    </p:extLst>
+  </p:cSld>
+  <p:clrMapOvr>
+    <a:masterClrMapping/>
+  </p:clrMapOvr>
+</p:sld>
+</file>
+
+<file path=ppt/slides/slide3.xml><?xml version="1.0" encoding="utf-8"?>
+<p:sld xmlns:a="http://schemas.openxmlformats.org/drawingml/2006/main" xmlns:r="http://schemas.openxmlformats.org/officeDocument/2006/relationships" xmlns:p="http://schemas.openxmlformats.org/presentationml/2006/main">
+  <p:cSld>
+    <p:spTree>
+      <p:nvGrpSpPr>
+        <p:cNvPr id="1" name="">
+          <a:extLst>
+            <a:ext uri="{FF2B5EF4-FFF2-40B4-BE49-F238E27FC236}">
+              <a16:creationId xmlns:a16="http://schemas.microsoft.com/office/drawing/2014/main" id="{2CEF325D-6D52-CD92-8B13-3329EAA69BFC}"/>
+            </a:ext>
+          </a:extLst>
+        </p:cNvPr>
+        <p:cNvGrpSpPr/>
+        <p:nvPr/>
+      </p:nvGrpSpPr>
+      <p:grpSpPr>
+        <a:xfrm>
+          <a:off x="0" y="0"/>
+          <a:ext cx="0" cy="0"/>
+          <a:chOff x="0" y="0"/>
+          <a:chExt cx="0" cy="0"/>
+        </a:xfrm>
+      </p:grpSpPr>
+      <p:pic>
+        <p:nvPicPr>
+          <p:cNvPr id="2052" name="Picture 4">
+            <a:extLst>
+              <a:ext uri="{FF2B5EF4-FFF2-40B4-BE49-F238E27FC236}">
+                <a16:creationId xmlns:a16="http://schemas.microsoft.com/office/drawing/2014/main" id="{E59ACFE5-EB60-E394-2A2E-207B19F5F8C6}"/>
+              </a:ext>
+            </a:extLst>
+          </p:cNvPr>
+          <p:cNvPicPr>
+            <a:picLocks noChangeAspect="1" noChangeArrowheads="1"/>
+          </p:cNvPicPr>
+          <p:nvPr/>
+        </p:nvPicPr>
+        <p:blipFill>
+          <a:blip r:embed="rId2">
+            <a:extLst>
+              <a:ext uri="{28A0092B-C50C-407E-A947-70E740481C1C}">
+                <a14:useLocalDpi xmlns:a14="http://schemas.microsoft.com/office/drawing/2010/main" val="0"/>
+              </a:ext>
+            </a:extLst>
+          </a:blip>
+          <a:srcRect/>
+          <a:stretch>
+            <a:fillRect/>
+          </a:stretch>
+        </p:blipFill>
+        <p:spPr bwMode="auto">
+          <a:xfrm>
+            <a:off x="9105390" y="1855499"/>
+            <a:ext cx="3086610" cy="3086610"/>
+          </a:xfrm>
+          <a:prstGeom prst="rect">
+            <a:avLst/>
+          </a:prstGeom>
+          <a:noFill/>
+          <a:extLst>
+            <a:ext uri="{909E8E84-426E-40DD-AFC4-6F175D3DCCD1}">
+              <a14:hiddenFill xmlns:a14="http://schemas.microsoft.com/office/drawing/2010/main">
+                <a:solidFill>
+                  <a:srgbClr val="FFFFFF"/>
+                </a:solidFill>
+              </a14:hiddenFill>
+            </a:ext>
+          </a:extLst>
+        </p:spPr>
+      </p:pic>
+      <p:grpSp>
+        <p:nvGrpSpPr>
+          <p:cNvPr id="13" name="Group 12">
+            <a:extLst>
+              <a:ext uri="{FF2B5EF4-FFF2-40B4-BE49-F238E27FC236}">
+                <a16:creationId xmlns:a16="http://schemas.microsoft.com/office/drawing/2014/main" id="{319405F3-D84B-9D37-2CE5-7AD9285BEA81}"/>
+              </a:ext>
+            </a:extLst>
+          </p:cNvPr>
+          <p:cNvGrpSpPr/>
+          <p:nvPr/>
+        </p:nvGrpSpPr>
+        <p:grpSpPr>
+          <a:xfrm>
+            <a:off x="2286000" y="1550699"/>
+            <a:ext cx="3073977" cy="3073977"/>
+            <a:chOff x="2341044" y="1855499"/>
+            <a:chExt cx="3073977" cy="3073977"/>
+          </a:xfrm>
+        </p:grpSpPr>
+        <p:sp>
+          <p:nvSpPr>
+            <p:cNvPr id="4" name="타원 1">
+              <a:extLst>
+                <a:ext uri="{FF2B5EF4-FFF2-40B4-BE49-F238E27FC236}">
+                  <a16:creationId xmlns:a16="http://schemas.microsoft.com/office/drawing/2014/main" id="{A8689BEB-3D44-5929-76DE-59E8D73CB5BB}"/>
+                </a:ext>
+              </a:extLst>
+            </p:cNvPr>
+            <p:cNvSpPr/>
+            <p:nvPr/>
+          </p:nvSpPr>
+          <p:spPr>
+            <a:xfrm>
+              <a:off x="2341044" y="1855499"/>
+              <a:ext cx="3073977" cy="3073977"/>
+            </a:xfrm>
+            <a:prstGeom prst="ellipse">
+              <a:avLst/>
+            </a:prstGeom>
+            <a:solidFill>
+              <a:srgbClr val="D9EBFF"/>
+            </a:solidFill>
+            <a:ln>
+              <a:noFill/>
+            </a:ln>
+          </p:spPr>
+          <p:style>
+            <a:lnRef idx="2">
+              <a:schemeClr val="accent1">
+                <a:shade val="15000"/>
+              </a:schemeClr>
+            </a:lnRef>
+            <a:fillRef idx="1">
+              <a:schemeClr val="accent1"/>
+            </a:fillRef>
+            <a:effectRef idx="0">
+              <a:schemeClr val="accent1"/>
+            </a:effectRef>
+            <a:fontRef idx="minor">
+              <a:schemeClr val="lt1"/>
+            </a:fontRef>
+          </p:style>
+          <p:txBody>
+            <a:bodyPr rtlCol="0" anchor="ctr"/>
+            <a:lstStyle/>
+            <a:p>
+              <a:pPr marL="0" marR="0" lvl="0" indent="0" algn="ctr" defTabSz="914400" rtl="0" eaLnBrk="1" fontAlgn="auto" latinLnBrk="1" hangingPunct="1">
+                <a:lnSpc>
+                  <a:spcPct val="100000"/>
+                </a:lnSpc>
+                <a:spcBef>
+                  <a:spcPts val="0"/>
+                </a:spcBef>
+                <a:spcAft>
+                  <a:spcPts val="0"/>
+                </a:spcAft>
+                <a:buClrTx/>
+                <a:buSzTx/>
+                <a:buFontTx/>
+                <a:buNone/>
+                <a:tabLst/>
+                <a:defRPr/>
+              </a:pPr>
+              <a:endParaRPr kumimoji="1" lang="ko-KR" altLang="en-US" sz="17000" b="1" u="none" strike="noStrike" kern="1200" cap="none" spc="0" normalizeH="0" baseline="0" noProof="0" dirty="0">
+                <a:ln>
+                  <a:noFill/>
+                </a:ln>
+                <a:solidFill>
+                  <a:srgbClr val="007AFF"/>
+                </a:solidFill>
+                <a:effectLst/>
+                <a:uLnTx/>
+                <a:uFillTx/>
+                <a:latin typeface="Arial" panose="020B0604020202020204" pitchFamily="34" charset="0"/>
+                <a:ea typeface="Apple SD Gothic Neo" panose="02000300000000000000" pitchFamily="2" charset="-127"/>
+                <a:cs typeface="Arial" panose="020B0604020202020204" pitchFamily="34" charset="0"/>
+              </a:endParaRPr>
+            </a:p>
+          </p:txBody>
+        </p:sp>
+        <p:sp>
+          <p:nvSpPr>
+            <p:cNvPr id="8" name="TextBox 7">
+              <a:extLst>
+                <a:ext uri="{FF2B5EF4-FFF2-40B4-BE49-F238E27FC236}">
+                  <a16:creationId xmlns:a16="http://schemas.microsoft.com/office/drawing/2014/main" id="{4142CB9A-9F17-EBBE-C4B5-A967264B442D}"/>
+                </a:ext>
+              </a:extLst>
+            </p:cNvPr>
+            <p:cNvSpPr txBox="1"/>
+            <p:nvPr/>
+          </p:nvSpPr>
+          <p:spPr>
+            <a:xfrm>
+              <a:off x="3201430" y="1919286"/>
+              <a:ext cx="1143000" cy="2862322"/>
+            </a:xfrm>
+            <a:prstGeom prst="rect">
+              <a:avLst/>
+            </a:prstGeom>
+            <a:noFill/>
+          </p:spPr>
+          <p:txBody>
+            <a:bodyPr wrap="square">
+              <a:spAutoFit/>
+            </a:bodyPr>
+            <a:lstStyle/>
+            <a:p>
+              <a:pPr algn="ctr"/>
+              <a:r>
+                <a:rPr kumimoji="1" lang="en-US" altLang="ko-KR" sz="18000" b="1" dirty="0">
+                  <a:solidFill>
+                    <a:srgbClr val="007AFF"/>
+                  </a:solidFill>
+                  <a:latin typeface="Arial" panose="020B0604020202020204" pitchFamily="34" charset="0"/>
+                  <a:ea typeface="Apple SD Gothic Neo" panose="02000300000000000000" pitchFamily="2" charset="-127"/>
+                  <a:cs typeface="Arial" panose="020B0604020202020204" pitchFamily="34" charset="0"/>
+                </a:rPr>
+                <a:t>J</a:t>
+              </a:r>
+              <a:endParaRPr lang="en-US" sz="18000" dirty="0"/>
+            </a:p>
+          </p:txBody>
+        </p:sp>
+        <p:sp>
+          <p:nvSpPr>
+            <p:cNvPr id="9" name="TextBox 8">
+              <a:extLst>
+                <a:ext uri="{FF2B5EF4-FFF2-40B4-BE49-F238E27FC236}">
+                  <a16:creationId xmlns:a16="http://schemas.microsoft.com/office/drawing/2014/main" id="{07626872-CD63-C287-3DF2-7E7A83799E99}"/>
+                </a:ext>
+              </a:extLst>
+            </p:cNvPr>
+            <p:cNvSpPr txBox="1"/>
+            <p:nvPr/>
+          </p:nvSpPr>
+          <p:spPr>
+            <a:xfrm>
+              <a:off x="3909960" y="2307730"/>
+              <a:ext cx="1143000" cy="2277547"/>
+            </a:xfrm>
+            <a:prstGeom prst="rect">
+              <a:avLst/>
+            </a:prstGeom>
+            <a:noFill/>
+          </p:spPr>
+          <p:txBody>
+            <a:bodyPr wrap="square">
+              <a:spAutoFit/>
+            </a:bodyPr>
+            <a:lstStyle/>
+            <a:p>
+              <a:pPr algn="ctr"/>
+              <a:r>
+                <a:rPr kumimoji="1" lang="en-US" altLang="ko-KR" sz="14200" b="1" dirty="0">
+                  <a:solidFill>
+                    <a:srgbClr val="007AFF"/>
+                  </a:solidFill>
+                  <a:latin typeface="Arial" panose="020B0604020202020204" pitchFamily="34" charset="0"/>
+                  <a:ea typeface="Apple SD Gothic Neo" panose="02000300000000000000" pitchFamily="2" charset="-127"/>
+                  <a:cs typeface="Arial" panose="020B0604020202020204" pitchFamily="34" charset="0"/>
+                </a:rPr>
+                <a:t>.</a:t>
+              </a:r>
+              <a:endParaRPr lang="en-US" sz="14200" dirty="0"/>
+            </a:p>
+          </p:txBody>
+        </p:sp>
+      </p:grpSp>
+      <p:sp>
+        <p:nvSpPr>
+          <p:cNvPr id="12" name="타원 6">
+            <a:extLst>
+              <a:ext uri="{FF2B5EF4-FFF2-40B4-BE49-F238E27FC236}">
+                <a16:creationId xmlns:a16="http://schemas.microsoft.com/office/drawing/2014/main" id="{97BBA9C6-0FBD-2D0A-365A-013020D714F3}"/>
+              </a:ext>
+            </a:extLst>
+          </p:cNvPr>
+          <p:cNvSpPr/>
+          <p:nvPr/>
+        </p:nvSpPr>
+        <p:spPr>
+          <a:xfrm>
+            <a:off x="6497810" y="2168133"/>
+            <a:ext cx="3073977" cy="3073977"/>
+          </a:xfrm>
+          <a:prstGeom prst="ellipse">
+            <a:avLst/>
+          </a:prstGeom>
+          <a:solidFill>
+            <a:srgbClr val="990000"/>
+          </a:solidFill>
+          <a:ln>
+            <a:noFill/>
+          </a:ln>
+          <a:effectLst>
+            <a:innerShdw blurRad="127000">
+              <a:srgbClr val="FF0000"/>
+            </a:innerShdw>
+          </a:effectLst>
+          <a:scene3d>
+            <a:camera prst="orthographicFront"/>
+            <a:lightRig rig="threePt" dir="t"/>
+          </a:scene3d>
+          <a:sp3d>
+            <a:bevelT w="152400" h="38100"/>
+          </a:sp3d>
+        </p:spPr>
+        <p:style>
+          <a:lnRef idx="2">
+            <a:schemeClr val="accent1">
+              <a:shade val="15000"/>
+            </a:schemeClr>
+          </a:lnRef>
+          <a:fillRef idx="1">
+            <a:schemeClr val="accent1"/>
+          </a:fillRef>
+          <a:effectRef idx="0">
+            <a:schemeClr val="accent1"/>
+          </a:effectRef>
+          <a:fontRef idx="minor">
+            <a:schemeClr val="lt1"/>
+          </a:fontRef>
+        </p:style>
+        <p:txBody>
+          <a:bodyPr rtlCol="0" anchor="ctr"/>
+          <a:lstStyle/>
+          <a:p>
+            <a:pPr marL="0" marR="0" lvl="0" indent="0" algn="ctr" defTabSz="914400" rtl="0" eaLnBrk="1" fontAlgn="auto" latinLnBrk="1" hangingPunct="1">
+              <a:lnSpc>
+                <a:spcPct val="100000"/>
+              </a:lnSpc>
+              <a:spcBef>
+                <a:spcPts val="0"/>
+              </a:spcBef>
+              <a:spcAft>
+                <a:spcPts val="0"/>
+              </a:spcAft>
+              <a:buClrTx/>
+              <a:buSzTx/>
+              <a:buFontTx/>
+              <a:buNone/>
+              <a:tabLst/>
+              <a:defRPr/>
+            </a:pPr>
+            <a:r>
+              <a:rPr kumimoji="1" lang="en-US" altLang="ko-KR" sz="11000" b="1" dirty="0">
+                <a:solidFill>
+                  <a:prstClr val="white"/>
+                </a:solidFill>
+                <a:latin typeface="Arial" panose="020B0604020202020204" pitchFamily="34" charset="0"/>
+                <a:ea typeface="Apple SD Gothic Neo" panose="02000300000000000000" pitchFamily="2" charset="-127"/>
+                <a:cs typeface="Arial" panose="020B0604020202020204" pitchFamily="34" charset="0"/>
+              </a:rPr>
+              <a:t>JH</a:t>
+            </a:r>
+            <a:endParaRPr kumimoji="1" lang="ko-KR" altLang="en-US" sz="11000" b="1" u="none" strike="noStrike" kern="1200" cap="none" spc="0" normalizeH="0" baseline="0" noProof="0" dirty="0">
+              <a:ln>
+                <a:noFill/>
+              </a:ln>
+              <a:solidFill>
+                <a:prstClr val="white"/>
+              </a:solidFill>
+              <a:effectLst/>
+              <a:uLnTx/>
+              <a:uFillTx/>
+              <a:latin typeface="Arial" panose="020B0604020202020204" pitchFamily="34" charset="0"/>
+              <a:ea typeface="Apple SD Gothic Neo" panose="02000300000000000000" pitchFamily="2" charset="-127"/>
+              <a:cs typeface="Arial" panose="020B0604020202020204" pitchFamily="34" charset="0"/>
+            </a:endParaRPr>
+          </a:p>
+        </p:txBody>
+      </p:sp>
+      <p:pic>
+        <p:nvPicPr>
+          <p:cNvPr id="18" name="Picture 17">
+            <a:extLst>
+              <a:ext uri="{FF2B5EF4-FFF2-40B4-BE49-F238E27FC236}">
+                <a16:creationId xmlns:a16="http://schemas.microsoft.com/office/drawing/2014/main" id="{B1E01F12-A7C7-91D6-2598-F7F788819672}"/>
+              </a:ext>
+            </a:extLst>
+          </p:cNvPr>
+          <p:cNvPicPr>
+            <a:picLocks noChangeAspect="1"/>
+          </p:cNvPicPr>
+          <p:nvPr/>
+        </p:nvPicPr>
+        <p:blipFill>
+          <a:blip r:embed="rId3"/>
+          <a:stretch>
+            <a:fillRect/>
+          </a:stretch>
+        </p:blipFill>
+        <p:spPr>
+          <a:xfrm>
+            <a:off x="4440150" y="-98920"/>
+            <a:ext cx="4051300" cy="4813300"/>
+          </a:xfrm>
+          <a:prstGeom prst="rect">
+            <a:avLst/>
+          </a:prstGeom>
+        </p:spPr>
+      </p:pic>
+    </p:spTree>
+    <p:extLst>
+      <p:ext uri="{BB962C8B-B14F-4D97-AF65-F5344CB8AC3E}">
+        <p14:creationId xmlns:p14="http://schemas.microsoft.com/office/powerpoint/2010/main" val="2124168653"/>
+      </p:ext>
+    </p:extLst>
+  </p:cSld>
+  <p:clrMapOvr>
+    <a:masterClrMapping/>
+  </p:clrMapOvr>
+</p:sld>
+</file>
+
+<file path=ppt/slides/slide4.xml><?xml version="1.0" encoding="utf-8"?>
+<p:sld xmlns:a="http://schemas.openxmlformats.org/drawingml/2006/main" xmlns:r="http://schemas.openxmlformats.org/officeDocument/2006/relationships" xmlns:p="http://schemas.openxmlformats.org/presentationml/2006/main">
+  <p:cSld>
+    <p:spTree>
+      <p:nvGrpSpPr>
+        <p:cNvPr id="1" name="">
+          <a:extLst>
+            <a:ext uri="{FF2B5EF4-FFF2-40B4-BE49-F238E27FC236}">
+              <a16:creationId xmlns:a16="http://schemas.microsoft.com/office/drawing/2014/main" id="{4449F7BD-DD8B-5855-39AF-F63B544463B7}"/>
+            </a:ext>
+          </a:extLst>
+        </p:cNvPr>
+        <p:cNvGrpSpPr/>
+        <p:nvPr/>
+      </p:nvGrpSpPr>
+      <p:grpSpPr>
+        <a:xfrm>
+          <a:off x="0" y="0"/>
+          <a:ext cx="0" cy="0"/>
+          <a:chOff x="0" y="0"/>
+          <a:chExt cx="0" cy="0"/>
+        </a:xfrm>
+      </p:grpSpPr>
+      <p:sp>
+        <p:nvSpPr>
+          <p:cNvPr id="2" name="타원 1">
+            <a:extLst>
+              <a:ext uri="{FF2B5EF4-FFF2-40B4-BE49-F238E27FC236}">
+                <a16:creationId xmlns:a16="http://schemas.microsoft.com/office/drawing/2014/main" id="{A6D89D77-2C70-3D65-9CF0-4FFFACBB7833}"/>
+              </a:ext>
+            </a:extLst>
+          </p:cNvPr>
+          <p:cNvSpPr/>
+          <p:nvPr/>
+        </p:nvSpPr>
+        <p:spPr>
+          <a:xfrm>
+            <a:off x="3521529" y="2791792"/>
+            <a:ext cx="3073977" cy="3073977"/>
+          </a:xfrm>
+          <a:prstGeom prst="ellipse">
+            <a:avLst/>
+          </a:prstGeom>
+          <a:solidFill>
+            <a:srgbClr val="D9EBFF"/>
+          </a:solidFill>
+          <a:ln>
+            <a:noFill/>
+          </a:ln>
+        </p:spPr>
+        <p:style>
+          <a:lnRef idx="2">
+            <a:schemeClr val="accent1">
+              <a:shade val="15000"/>
+            </a:schemeClr>
+          </a:lnRef>
+          <a:fillRef idx="1">
+            <a:schemeClr val="accent1"/>
+          </a:fillRef>
+          <a:effectRef idx="0">
+            <a:schemeClr val="accent1"/>
+          </a:effectRef>
+          <a:fontRef idx="minor">
+            <a:schemeClr val="lt1"/>
+          </a:fontRef>
+        </p:style>
+        <p:txBody>
+          <a:bodyPr rtlCol="0" anchor="ctr"/>
+          <a:lstStyle/>
+          <a:p>
+            <a:pPr marL="0" marR="0" lvl="0" indent="0" algn="ctr" defTabSz="914400" rtl="0" eaLnBrk="1" fontAlgn="auto" latinLnBrk="1" hangingPunct="1">
+              <a:lnSpc>
+                <a:spcPct val="100000"/>
+              </a:lnSpc>
+              <a:spcBef>
+                <a:spcPts val="0"/>
+              </a:spcBef>
+              <a:spcAft>
+                <a:spcPts val="0"/>
+              </a:spcAft>
+              <a:buClrTx/>
+              <a:buSzTx/>
+              <a:buFontTx/>
+              <a:buNone/>
+              <a:tabLst/>
+              <a:defRPr/>
+            </a:pPr>
+            <a:r>
+              <a:rPr kumimoji="1" lang="en-US" altLang="ko-KR" sz="17000" b="1" dirty="0">
+                <a:solidFill>
+                  <a:srgbClr val="007AFF"/>
+                </a:solidFill>
+                <a:latin typeface="Arial" panose="020B0604020202020204" pitchFamily="34" charset="0"/>
+                <a:ea typeface="Apple SD Gothic Neo" panose="02000300000000000000" pitchFamily="2" charset="-127"/>
+                <a:cs typeface="Arial" panose="020B0604020202020204" pitchFamily="34" charset="0"/>
+              </a:rPr>
+              <a:t>J</a:t>
+            </a:r>
+            <a:r>
+              <a:rPr kumimoji="1" lang="en-US" altLang="ko-KR" sz="14200" b="1" dirty="0">
+                <a:solidFill>
+                  <a:srgbClr val="007AFF"/>
+                </a:solidFill>
+                <a:latin typeface="Arial" panose="020B0604020202020204" pitchFamily="34" charset="0"/>
+                <a:ea typeface="Apple SD Gothic Neo" panose="02000300000000000000" pitchFamily="2" charset="-127"/>
+                <a:cs typeface="Arial" panose="020B0604020202020204" pitchFamily="34" charset="0"/>
+              </a:rPr>
+              <a:t>.</a:t>
+            </a:r>
+            <a:endParaRPr kumimoji="1" lang="ko-KR" altLang="en-US" sz="17000" b="1" u="none" strike="noStrike" kern="1200" cap="none" spc="0" normalizeH="0" baseline="0" noProof="0" dirty="0">
+              <a:ln>
+                <a:noFill/>
+              </a:ln>
+              <a:solidFill>
+                <a:srgbClr val="007AFF"/>
+              </a:solidFill>
+              <a:effectLst/>
+              <a:uLnTx/>
+              <a:uFillTx/>
+              <a:latin typeface="Arial" panose="020B0604020202020204" pitchFamily="34" charset="0"/>
+              <a:ea typeface="Apple SD Gothic Neo" panose="02000300000000000000" pitchFamily="2" charset="-127"/>
+              <a:cs typeface="Arial" panose="020B0604020202020204" pitchFamily="34" charset="0"/>
+            </a:endParaRPr>
+          </a:p>
+        </p:txBody>
+      </p:sp>
+      <p:pic>
+        <p:nvPicPr>
+          <p:cNvPr id="3" name="Picture 2" descr="Juhyung Lee">
+            <a:extLst>
+              <a:ext uri="{FF2B5EF4-FFF2-40B4-BE49-F238E27FC236}">
+                <a16:creationId xmlns:a16="http://schemas.microsoft.com/office/drawing/2014/main" id="{40826817-80CA-BC0A-55CC-DA9349CBD8DE}"/>
+              </a:ext>
+            </a:extLst>
+          </p:cNvPr>
+          <p:cNvPicPr>
+            <a:picLocks noChangeAspect="1" noChangeArrowheads="1"/>
+          </p:cNvPicPr>
+          <p:nvPr/>
+        </p:nvPicPr>
+        <p:blipFill>
+          <a:blip r:embed="rId2">
+            <a:extLst>
+              <a:ext uri="{28A0092B-C50C-407E-A947-70E740481C1C}">
+                <a14:useLocalDpi xmlns:a14="http://schemas.microsoft.com/office/drawing/2010/main" val="0"/>
+              </a:ext>
+            </a:extLst>
+          </a:blip>
+          <a:srcRect/>
+          <a:stretch>
+            <a:fillRect/>
+          </a:stretch>
+        </p:blipFill>
+        <p:spPr bwMode="auto">
+          <a:xfrm>
+            <a:off x="643906" y="293172"/>
+            <a:ext cx="9613900" cy="2400300"/>
+          </a:xfrm>
+          <a:prstGeom prst="rect">
+            <a:avLst/>
+          </a:prstGeom>
+          <a:noFill/>
+          <a:extLst>
+            <a:ext uri="{909E8E84-426E-40DD-AFC4-6F175D3DCCD1}">
+              <a14:hiddenFill xmlns:a14="http://schemas.microsoft.com/office/drawing/2010/main">
+                <a:solidFill>
+                  <a:srgbClr val="FFFFFF"/>
+                </a:solidFill>
+              </a14:hiddenFill>
+            </a:ext>
+          </a:extLst>
+        </p:spPr>
+      </p:pic>
+      <p:pic>
+        <p:nvPicPr>
+          <p:cNvPr id="2052" name="Picture 4">
+            <a:extLst>
+              <a:ext uri="{FF2B5EF4-FFF2-40B4-BE49-F238E27FC236}">
+                <a16:creationId xmlns:a16="http://schemas.microsoft.com/office/drawing/2014/main" id="{1DCF6A2B-F470-D856-211D-9CA4C08C8E7A}"/>
+              </a:ext>
+            </a:extLst>
+          </p:cNvPr>
+          <p:cNvPicPr>
+            <a:picLocks noChangeAspect="1" noChangeArrowheads="1"/>
+          </p:cNvPicPr>
+          <p:nvPr/>
+        </p:nvPicPr>
+        <p:blipFill>
+          <a:blip r:embed="rId3">
+            <a:extLst>
+              <a:ext uri="{28A0092B-C50C-407E-A947-70E740481C1C}">
+                <a14:useLocalDpi xmlns:a14="http://schemas.microsoft.com/office/drawing/2010/main" val="0"/>
+              </a:ext>
+            </a:extLst>
+          </a:blip>
+          <a:srcRect/>
+          <a:stretch>
+            <a:fillRect/>
+          </a:stretch>
+        </p:blipFill>
+        <p:spPr bwMode="auto">
+          <a:xfrm>
+            <a:off x="7424019" y="2791792"/>
+            <a:ext cx="3086610" cy="3086610"/>
+          </a:xfrm>
+          <a:prstGeom prst="rect">
+            <a:avLst/>
+          </a:prstGeom>
+          <a:noFill/>
+          <a:extLst>
+            <a:ext uri="{909E8E84-426E-40DD-AFC4-6F175D3DCCD1}">
+              <a14:hiddenFill xmlns:a14="http://schemas.microsoft.com/office/drawing/2010/main">
+                <a:solidFill>
+                  <a:srgbClr val="FFFFFF"/>
+                </a:solidFill>
+              </a14:hiddenFill>
+            </a:ext>
+          </a:extLst>
+        </p:spPr>
+      </p:pic>
+      <p:sp>
+        <p:nvSpPr>
+          <p:cNvPr id="4" name="타원 1">
+            <a:extLst>
+              <a:ext uri="{FF2B5EF4-FFF2-40B4-BE49-F238E27FC236}">
+                <a16:creationId xmlns:a16="http://schemas.microsoft.com/office/drawing/2014/main" id="{DEBF85C6-2C49-4AFE-997A-4FB5DF0CA65E}"/>
+              </a:ext>
+            </a:extLst>
+          </p:cNvPr>
+          <p:cNvSpPr/>
+          <p:nvPr/>
+        </p:nvSpPr>
+        <p:spPr>
+          <a:xfrm>
+            <a:off x="144382" y="2804425"/>
+            <a:ext cx="3073977" cy="3073977"/>
+          </a:xfrm>
+          <a:prstGeom prst="ellipse">
+            <a:avLst/>
+          </a:prstGeom>
+          <a:solidFill>
+            <a:srgbClr val="D9EBFF"/>
+          </a:solidFill>
+          <a:ln>
+            <a:noFill/>
+          </a:ln>
+        </p:spPr>
+        <p:style>
+          <a:lnRef idx="2">
+            <a:schemeClr val="accent1">
+              <a:shade val="15000"/>
+            </a:schemeClr>
+          </a:lnRef>
+          <a:fillRef idx="1">
+            <a:schemeClr val="accent1"/>
+          </a:fillRef>
+          <a:effectRef idx="0">
+            <a:schemeClr val="accent1"/>
+          </a:effectRef>
+          <a:fontRef idx="minor">
+            <a:schemeClr val="lt1"/>
+          </a:fontRef>
+        </p:style>
+        <p:txBody>
+          <a:bodyPr rtlCol="0" anchor="ctr"/>
+          <a:lstStyle/>
+          <a:p>
+            <a:pPr marL="0" marR="0" lvl="0" indent="0" algn="ctr" defTabSz="914400" rtl="0" eaLnBrk="1" fontAlgn="auto" latinLnBrk="1" hangingPunct="1">
+              <a:lnSpc>
+                <a:spcPct val="100000"/>
+              </a:lnSpc>
+              <a:spcBef>
+                <a:spcPts val="0"/>
+              </a:spcBef>
+              <a:spcAft>
+                <a:spcPts val="0"/>
+              </a:spcAft>
+              <a:buClrTx/>
+              <a:buSzTx/>
+              <a:buFontTx/>
+              <a:buNone/>
+              <a:tabLst/>
+              <a:defRPr/>
+            </a:pPr>
+            <a:endParaRPr kumimoji="1" lang="ko-KR" altLang="en-US" sz="17000" b="1" u="none" strike="noStrike" kern="1200" cap="none" spc="0" normalizeH="0" baseline="0" noProof="0" dirty="0">
+              <a:ln>
+                <a:noFill/>
+              </a:ln>
+              <a:solidFill>
+                <a:srgbClr val="007AFF"/>
+              </a:solidFill>
+              <a:effectLst/>
+              <a:uLnTx/>
+              <a:uFillTx/>
+              <a:latin typeface="Arial" panose="020B0604020202020204" pitchFamily="34" charset="0"/>
+              <a:ea typeface="Apple SD Gothic Neo" panose="02000300000000000000" pitchFamily="2" charset="-127"/>
+              <a:cs typeface="Arial" panose="020B0604020202020204" pitchFamily="34" charset="0"/>
+            </a:endParaRPr>
+          </a:p>
+        </p:txBody>
+      </p:sp>
+      <p:grpSp>
+        <p:nvGrpSpPr>
+          <p:cNvPr id="10" name="Group 9">
+            <a:extLst>
+              <a:ext uri="{FF2B5EF4-FFF2-40B4-BE49-F238E27FC236}">
+                <a16:creationId xmlns:a16="http://schemas.microsoft.com/office/drawing/2014/main" id="{A8EEE1F8-930C-95E8-33A2-3811C8E864E3}"/>
+              </a:ext>
+            </a:extLst>
+          </p:cNvPr>
+          <p:cNvGrpSpPr/>
+          <p:nvPr/>
+        </p:nvGrpSpPr>
+        <p:grpSpPr>
+          <a:xfrm>
+            <a:off x="969193" y="2947004"/>
+            <a:ext cx="1866085" cy="2708434"/>
+            <a:chOff x="836529" y="2957052"/>
+            <a:chExt cx="1866085" cy="2708434"/>
+          </a:xfrm>
+        </p:grpSpPr>
+        <p:sp>
+          <p:nvSpPr>
+            <p:cNvPr id="8" name="TextBox 7">
+              <a:extLst>
+                <a:ext uri="{FF2B5EF4-FFF2-40B4-BE49-F238E27FC236}">
+                  <a16:creationId xmlns:a16="http://schemas.microsoft.com/office/drawing/2014/main" id="{D707CDF1-FDD8-DDD4-2C1A-7B2D89D24F38}"/>
+                </a:ext>
+              </a:extLst>
+            </p:cNvPr>
+            <p:cNvSpPr txBox="1"/>
+            <p:nvPr/>
+          </p:nvSpPr>
+          <p:spPr>
+            <a:xfrm>
+              <a:off x="836529" y="2957052"/>
+              <a:ext cx="1143000" cy="2708434"/>
+            </a:xfrm>
+            <a:prstGeom prst="rect">
+              <a:avLst/>
+            </a:prstGeom>
+            <a:noFill/>
+          </p:spPr>
+          <p:txBody>
+            <a:bodyPr wrap="square">
+              <a:spAutoFit/>
+            </a:bodyPr>
+            <a:lstStyle/>
+            <a:p>
+              <a:pPr algn="ctr"/>
+              <a:r>
+                <a:rPr kumimoji="1" lang="en-US" altLang="ko-KR" sz="17000" b="1" dirty="0">
+                  <a:solidFill>
+                    <a:srgbClr val="007AFF"/>
+                  </a:solidFill>
+                  <a:latin typeface="Arial" panose="020B0604020202020204" pitchFamily="34" charset="0"/>
+                  <a:ea typeface="Apple SD Gothic Neo" panose="02000300000000000000" pitchFamily="2" charset="-127"/>
+                  <a:cs typeface="Arial" panose="020B0604020202020204" pitchFamily="34" charset="0"/>
+                </a:rPr>
+                <a:t>J</a:t>
+              </a:r>
+              <a:endParaRPr lang="en-US" sz="17000" dirty="0"/>
+            </a:p>
+          </p:txBody>
+        </p:sp>
+        <p:sp>
+          <p:nvSpPr>
+            <p:cNvPr id="9" name="TextBox 8">
+              <a:extLst>
+                <a:ext uri="{FF2B5EF4-FFF2-40B4-BE49-F238E27FC236}">
+                  <a16:creationId xmlns:a16="http://schemas.microsoft.com/office/drawing/2014/main" id="{1F5BCA36-588C-F4E6-ECD2-38E41809A70E}"/>
+                </a:ext>
+              </a:extLst>
+            </p:cNvPr>
+            <p:cNvSpPr txBox="1"/>
+            <p:nvPr/>
+          </p:nvSpPr>
+          <p:spPr>
+            <a:xfrm>
+              <a:off x="1559614" y="3308744"/>
+              <a:ext cx="1143000" cy="2277547"/>
+            </a:xfrm>
+            <a:prstGeom prst="rect">
+              <a:avLst/>
+            </a:prstGeom>
+            <a:noFill/>
+          </p:spPr>
+          <p:txBody>
+            <a:bodyPr wrap="square">
+              <a:spAutoFit/>
+            </a:bodyPr>
+            <a:lstStyle/>
+            <a:p>
+              <a:pPr algn="ctr"/>
+              <a:r>
+                <a:rPr kumimoji="1" lang="en-US" altLang="ko-KR" sz="14200" b="1" dirty="0">
+                  <a:solidFill>
+                    <a:srgbClr val="007AFF"/>
+                  </a:solidFill>
+                  <a:latin typeface="Arial" panose="020B0604020202020204" pitchFamily="34" charset="0"/>
+                  <a:ea typeface="Apple SD Gothic Neo" panose="02000300000000000000" pitchFamily="2" charset="-127"/>
+                  <a:cs typeface="Arial" panose="020B0604020202020204" pitchFamily="34" charset="0"/>
+                </a:rPr>
+                <a:t>.</a:t>
+              </a:r>
+              <a:endParaRPr lang="en-US" sz="14200" dirty="0"/>
+            </a:p>
+          </p:txBody>
+        </p:sp>
+      </p:grpSp>
+    </p:spTree>
+    <p:extLst>
+      <p:ext uri="{BB962C8B-B14F-4D97-AF65-F5344CB8AC3E}">
+        <p14:creationId xmlns:p14="http://schemas.microsoft.com/office/powerpoint/2010/main" val="1452256047"/>
+      </p:ext>
+    </p:extLst>
+  </p:cSld>
+  <p:clrMapOvr>
+    <a:masterClrMapping/>
+  </p:clrMapOvr>
+</p:sld>
+</file>
+
+<file path=ppt/slides/slide5.xml><?xml version="1.0" encoding="utf-8"?>
+<p:sld xmlns:a="http://schemas.openxmlformats.org/drawingml/2006/main" xmlns:r="http://schemas.openxmlformats.org/officeDocument/2006/relationships" xmlns:p="http://schemas.openxmlformats.org/presentationml/2006/main">
+  <p:cSld>
+    <p:spTree>
+      <p:nvGrpSpPr>
+        <p:cNvPr id="1" name="">
+          <a:extLst>
+            <a:ext uri="{FF2B5EF4-FFF2-40B4-BE49-F238E27FC236}">
+              <a16:creationId xmlns:a16="http://schemas.microsoft.com/office/drawing/2014/main" id="{6093409B-4751-FF81-E06D-C8A24A7CE741}"/>
+            </a:ext>
+          </a:extLst>
+        </p:cNvPr>
+        <p:cNvGrpSpPr/>
+        <p:nvPr/>
+      </p:nvGrpSpPr>
+      <p:grpSpPr>
+        <a:xfrm>
+          <a:off x="0" y="0"/>
+          <a:ext cx="0" cy="0"/>
+          <a:chOff x="0" y="0"/>
+          <a:chExt cx="0" cy="0"/>
+        </a:xfrm>
+      </p:grpSpPr>
       <p:sp>
         <p:nvSpPr>
           <p:cNvPr id="5" name="타원 4">
             <a:extLst>
               <a:ext uri="{FF2B5EF4-FFF2-40B4-BE49-F238E27FC236}">
-                <a16:creationId xmlns:a16="http://schemas.microsoft.com/office/drawing/2014/main" id="{6DBE8BD5-79B3-1BA8-297F-E6037AFC92C2}"/>
+                <a16:creationId xmlns:a16="http://schemas.microsoft.com/office/drawing/2014/main" id="{FD42B437-B497-6982-A77D-58AE13649DAE}"/>
               </a:ext>
             </a:extLst>
           </p:cNvPr>
@@ -3428,7 +4390,7 @@
           <p:cNvPr id="7" name="타원 6">
             <a:extLst>
               <a:ext uri="{FF2B5EF4-FFF2-40B4-BE49-F238E27FC236}">
-                <a16:creationId xmlns:a16="http://schemas.microsoft.com/office/drawing/2014/main" id="{193B6F19-3515-AB00-BEED-A2B8F64A98D4}"/>
+                <a16:creationId xmlns:a16="http://schemas.microsoft.com/office/drawing/2014/main" id="{E39B4A07-7B67-25E1-7FF9-C40F751AF11F}"/>
               </a:ext>
             </a:extLst>
           </p:cNvPr>
@@ -3532,7 +4494,7 @@
           <p:cNvPr id="2" name="타원 1">
             <a:extLst>
               <a:ext uri="{FF2B5EF4-FFF2-40B4-BE49-F238E27FC236}">
-                <a16:creationId xmlns:a16="http://schemas.microsoft.com/office/drawing/2014/main" id="{5A0237EB-6B69-90C8-DE2C-6AA7A0B9D298}"/>
+                <a16:creationId xmlns:a16="http://schemas.microsoft.com/office/drawing/2014/main" id="{7FFCA114-3D4B-6D76-5EEB-03850B486B1B}"/>
               </a:ext>
             </a:extLst>
           </p:cNvPr>
@@ -3622,7 +4584,7 @@
     </p:spTree>
     <p:extLst>
       <p:ext uri="{BB962C8B-B14F-4D97-AF65-F5344CB8AC3E}">
-        <p14:creationId xmlns:p14="http://schemas.microsoft.com/office/powerpoint/2010/main" val="3253071500"/>
+        <p14:creationId xmlns:p14="http://schemas.microsoft.com/office/powerpoint/2010/main" val="792068251"/>
       </p:ext>
     </p:extLst>
   </p:cSld>
@@ -3632,7 +4594,7 @@
 </p:sld>
 </file>
 
-<file path=ppt/slides/slide2.xml><?xml version="1.0" encoding="utf-8"?>
+<file path=ppt/slides/slide6.xml><?xml version="1.0" encoding="utf-8"?>
 <p:sld xmlns:a="http://schemas.openxmlformats.org/drawingml/2006/main" xmlns:r="http://schemas.openxmlformats.org/officeDocument/2006/relationships" xmlns:p="http://schemas.openxmlformats.org/presentationml/2006/main">
   <p:cSld>
     <p:spTree>
@@ -3900,543 +4862,7 @@
 </p:sld>
 </file>
 
-<file path=ppt/slides/slide3.xml><?xml version="1.0" encoding="utf-8"?>
-<p:sld xmlns:a="http://schemas.openxmlformats.org/drawingml/2006/main" xmlns:r="http://schemas.openxmlformats.org/officeDocument/2006/relationships" xmlns:p="http://schemas.openxmlformats.org/presentationml/2006/main">
-  <p:cSld>
-    <p:spTree>
-      <p:nvGrpSpPr>
-        <p:cNvPr id="1" name=""/>
-        <p:cNvGrpSpPr/>
-        <p:nvPr/>
-      </p:nvGrpSpPr>
-      <p:grpSpPr>
-        <a:xfrm>
-          <a:off x="0" y="0"/>
-          <a:ext cx="0" cy="0"/>
-          <a:chOff x="0" y="0"/>
-          <a:chExt cx="0" cy="0"/>
-        </a:xfrm>
-      </p:grpSpPr>
-      <p:grpSp>
-        <p:nvGrpSpPr>
-          <p:cNvPr id="2" name="그룹 1">
-            <a:extLst>
-              <a:ext uri="{FF2B5EF4-FFF2-40B4-BE49-F238E27FC236}">
-                <a16:creationId xmlns:a16="http://schemas.microsoft.com/office/drawing/2014/main" id="{6EF017CE-2165-177A-F049-A85E2B81E5B3}"/>
-              </a:ext>
-            </a:extLst>
-          </p:cNvPr>
-          <p:cNvGrpSpPr/>
-          <p:nvPr/>
-        </p:nvGrpSpPr>
-        <p:grpSpPr>
-          <a:xfrm>
-            <a:off x="6702137" y="1826924"/>
-            <a:ext cx="3073977" cy="3073977"/>
-            <a:chOff x="6702137" y="1826924"/>
-            <a:chExt cx="3073977" cy="3073977"/>
-          </a:xfrm>
-        </p:grpSpPr>
-        <p:sp>
-          <p:nvSpPr>
-            <p:cNvPr id="6" name="타원 5">
-              <a:extLst>
-                <a:ext uri="{FF2B5EF4-FFF2-40B4-BE49-F238E27FC236}">
-                  <a16:creationId xmlns:a16="http://schemas.microsoft.com/office/drawing/2014/main" id="{6109E5B9-341B-23C0-6D0C-CC13C2329AFF}"/>
-                </a:ext>
-              </a:extLst>
-            </p:cNvPr>
-            <p:cNvSpPr/>
-            <p:nvPr/>
-          </p:nvSpPr>
-          <p:spPr>
-            <a:xfrm>
-              <a:off x="6702137" y="1826924"/>
-              <a:ext cx="3073977" cy="3073977"/>
-            </a:xfrm>
-            <a:prstGeom prst="ellipse">
-              <a:avLst/>
-            </a:prstGeom>
-            <a:solidFill>
-              <a:srgbClr val="06DB72"/>
-            </a:solidFill>
-            <a:ln>
-              <a:noFill/>
-            </a:ln>
-          </p:spPr>
-          <p:style>
-            <a:lnRef idx="2">
-              <a:schemeClr val="accent1">
-                <a:shade val="15000"/>
-              </a:schemeClr>
-            </a:lnRef>
-            <a:fillRef idx="1">
-              <a:schemeClr val="accent1"/>
-            </a:fillRef>
-            <a:effectRef idx="0">
-              <a:schemeClr val="accent1"/>
-            </a:effectRef>
-            <a:fontRef idx="minor">
-              <a:schemeClr val="lt1"/>
-            </a:fontRef>
-          </p:style>
-          <p:txBody>
-            <a:bodyPr rtlCol="0" anchor="ctr"/>
-            <a:lstStyle/>
-            <a:p>
-              <a:pPr marL="0" marR="0" lvl="0" indent="0" algn="ctr" defTabSz="914400" rtl="0" eaLnBrk="1" fontAlgn="auto" latinLnBrk="1" hangingPunct="1">
-                <a:lnSpc>
-                  <a:spcPct val="100000"/>
-                </a:lnSpc>
-                <a:spcBef>
-                  <a:spcPts val="0"/>
-                </a:spcBef>
-                <a:spcAft>
-                  <a:spcPts val="0"/>
-                </a:spcAft>
-                <a:buClrTx/>
-                <a:buSzTx/>
-                <a:buFontTx/>
-                <a:buNone/>
-                <a:tabLst/>
-                <a:defRPr/>
-              </a:pPr>
-              <a:endParaRPr kumimoji="1" lang="ko-KR" altLang="en-US" sz="1800" b="0" i="0" u="none" strike="noStrike" kern="1200" cap="none" spc="0" normalizeH="0" baseline="0" noProof="0" dirty="0">
-                <a:ln>
-                  <a:noFill/>
-                </a:ln>
-                <a:solidFill>
-                  <a:prstClr val="white"/>
-                </a:solidFill>
-                <a:effectLst/>
-                <a:uLnTx/>
-                <a:uFillTx/>
-                <a:latin typeface="맑은 고딕" panose="02110004020202020204"/>
-                <a:ea typeface="맑은 고딕" panose="020B0503020000020004" pitchFamily="34" charset="-127"/>
-                <a:cs typeface="+mn-cs"/>
-              </a:endParaRPr>
-            </a:p>
-          </p:txBody>
-        </p:sp>
-        <p:pic>
-          <p:nvPicPr>
-            <p:cNvPr id="5" name="그림 4">
-              <a:extLst>
-                <a:ext uri="{FF2B5EF4-FFF2-40B4-BE49-F238E27FC236}">
-                  <a16:creationId xmlns:a16="http://schemas.microsoft.com/office/drawing/2014/main" id="{3AAC9233-8689-4786-2DA2-A6F39FD7308B}"/>
-                </a:ext>
-              </a:extLst>
-            </p:cNvPr>
-            <p:cNvPicPr>
-              <a:picLocks noChangeAspect="1"/>
-            </p:cNvPicPr>
-            <p:nvPr/>
-          </p:nvPicPr>
-          <p:blipFill>
-            <a:blip r:embed="rId2">
-              <a:lum bright="70000" contrast="-70000"/>
-              <a:extLst>
-                <a:ext uri="{BEBA8EAE-BF5A-486C-A8C5-ECC9F3942E4B}">
-                  <a14:imgProps xmlns:a14="http://schemas.microsoft.com/office/drawing/2010/main">
-                    <a14:imgLayer r:embed="rId3">
-                      <a14:imgEffect>
-                        <a14:artisticPhotocopy/>
-                      </a14:imgEffect>
-                    </a14:imgLayer>
-                  </a14:imgProps>
-                </a:ext>
-              </a:extLst>
-            </a:blip>
-            <a:stretch>
-              <a:fillRect/>
-            </a:stretch>
-          </p:blipFill>
-          <p:spPr>
-            <a:xfrm>
-              <a:off x="7032466" y="2263583"/>
-              <a:ext cx="2413319" cy="2413319"/>
-            </a:xfrm>
-            <a:prstGeom prst="rect">
-              <a:avLst/>
-            </a:prstGeom>
-            <a:noFill/>
-          </p:spPr>
-        </p:pic>
-      </p:grpSp>
-      <p:pic>
-        <p:nvPicPr>
-          <p:cNvPr id="1026" name="Picture 2" descr="What do the icons on the Apple Watch mean? - Coolblue - anything for a smile">
-            <a:extLst>
-              <a:ext uri="{FF2B5EF4-FFF2-40B4-BE49-F238E27FC236}">
-                <a16:creationId xmlns:a16="http://schemas.microsoft.com/office/drawing/2014/main" id="{5E409C04-0A7D-E8BA-7ACC-1AA1F705E327}"/>
-              </a:ext>
-            </a:extLst>
-          </p:cNvPr>
-          <p:cNvPicPr>
-            <a:picLocks noChangeAspect="1" noChangeArrowheads="1"/>
-          </p:cNvPicPr>
-          <p:nvPr/>
-        </p:nvPicPr>
-        <p:blipFill rotWithShape="1">
-          <a:blip r:embed="rId4">
-            <a:extLst>
-              <a:ext uri="{28A0092B-C50C-407E-A947-70E740481C1C}">
-                <a14:useLocalDpi xmlns:a14="http://schemas.microsoft.com/office/drawing/2010/main" val="0"/>
-              </a:ext>
-            </a:extLst>
-          </a:blip>
-          <a:srcRect t="13002" r="44014" b="42389"/>
-          <a:stretch/>
-        </p:blipFill>
-        <p:spPr bwMode="auto">
-          <a:xfrm>
-            <a:off x="-2559248" y="-412753"/>
-            <a:ext cx="5972572" cy="2679702"/>
-          </a:xfrm>
-          <a:prstGeom prst="rect">
-            <a:avLst/>
-          </a:prstGeom>
-          <a:noFill/>
-          <a:extLst>
-            <a:ext uri="{909E8E84-426E-40DD-AFC4-6F175D3DCCD1}">
-              <a14:hiddenFill xmlns:a14="http://schemas.microsoft.com/office/drawing/2010/main">
-                <a:solidFill>
-                  <a:srgbClr val="FFFFFF"/>
-                </a:solidFill>
-              </a14:hiddenFill>
-            </a:ext>
-          </a:extLst>
-        </p:spPr>
-      </p:pic>
-      <p:sp>
-        <p:nvSpPr>
-          <p:cNvPr id="7" name="모서리가 둥근 직사각형 6">
-            <a:extLst>
-              <a:ext uri="{FF2B5EF4-FFF2-40B4-BE49-F238E27FC236}">
-                <a16:creationId xmlns:a16="http://schemas.microsoft.com/office/drawing/2014/main" id="{ADF2AB41-DE26-F386-95B9-6492EBB68386}"/>
-              </a:ext>
-            </a:extLst>
-          </p:cNvPr>
-          <p:cNvSpPr/>
-          <p:nvPr/>
-        </p:nvSpPr>
-        <p:spPr>
-          <a:xfrm>
-            <a:off x="1045369" y="3548064"/>
-            <a:ext cx="3929063" cy="2679703"/>
-          </a:xfrm>
-          <a:prstGeom prst="roundRect">
-            <a:avLst>
-              <a:gd name="adj" fmla="val 47230"/>
-            </a:avLst>
-          </a:prstGeom>
-          <a:solidFill>
-            <a:srgbClr val="06DB72"/>
-          </a:solidFill>
-          <a:ln>
-            <a:noFill/>
-          </a:ln>
-        </p:spPr>
-        <p:style>
-          <a:lnRef idx="2">
-            <a:schemeClr val="accent1">
-              <a:shade val="15000"/>
-            </a:schemeClr>
-          </a:lnRef>
-          <a:fillRef idx="1">
-            <a:schemeClr val="accent1"/>
-          </a:fillRef>
-          <a:effectRef idx="0">
-            <a:schemeClr val="accent1"/>
-          </a:effectRef>
-          <a:fontRef idx="minor">
-            <a:schemeClr val="lt1"/>
-          </a:fontRef>
-        </p:style>
-        <p:txBody>
-          <a:bodyPr rtlCol="0" anchor="ctr"/>
-          <a:lstStyle/>
-          <a:p>
-            <a:pPr algn="ctr"/>
-            <a:endParaRPr kumimoji="1" lang="ko-KR" altLang="en-US" dirty="0"/>
-          </a:p>
-        </p:txBody>
-      </p:sp>
-      <p:pic>
-        <p:nvPicPr>
-          <p:cNvPr id="3" name="그림 2">
-            <a:extLst>
-              <a:ext uri="{FF2B5EF4-FFF2-40B4-BE49-F238E27FC236}">
-                <a16:creationId xmlns:a16="http://schemas.microsoft.com/office/drawing/2014/main" id="{44E74B8E-1C15-9EE9-6D9A-B03FC9CF3B76}"/>
-              </a:ext>
-            </a:extLst>
-          </p:cNvPr>
-          <p:cNvPicPr>
-            <a:picLocks noChangeAspect="1"/>
-          </p:cNvPicPr>
-          <p:nvPr/>
-        </p:nvPicPr>
-        <p:blipFill>
-          <a:blip r:embed="rId2">
-            <a:lum bright="70000" contrast="-70000"/>
-            <a:extLst>
-              <a:ext uri="{BEBA8EAE-BF5A-486C-A8C5-ECC9F3942E4B}">
-                <a14:imgProps xmlns:a14="http://schemas.microsoft.com/office/drawing/2010/main">
-                  <a14:imgLayer r:embed="rId5">
-                    <a14:imgEffect>
-                      <a14:artisticPhotocopy/>
-                    </a14:imgEffect>
-                  </a14:imgLayer>
-                </a14:imgProps>
-              </a:ext>
-            </a:extLst>
-          </a:blip>
-          <a:stretch>
-            <a:fillRect/>
-          </a:stretch>
-        </p:blipFill>
-        <p:spPr>
-          <a:xfrm>
-            <a:off x="1682575" y="3560590"/>
-            <a:ext cx="2654651" cy="2654651"/>
-          </a:xfrm>
-          <a:prstGeom prst="rect">
-            <a:avLst/>
-          </a:prstGeom>
-          <a:noFill/>
-        </p:spPr>
-      </p:pic>
-    </p:spTree>
-    <p:extLst>
-      <p:ext uri="{BB962C8B-B14F-4D97-AF65-F5344CB8AC3E}">
-        <p14:creationId xmlns:p14="http://schemas.microsoft.com/office/powerpoint/2010/main" val="3085959676"/>
-      </p:ext>
-    </p:extLst>
-  </p:cSld>
-  <p:clrMapOvr>
-    <a:masterClrMapping/>
-  </p:clrMapOvr>
-</p:sld>
-</file>
-
-<file path=ppt/slides/slide4.xml><?xml version="1.0" encoding="utf-8"?>
-<p:sld xmlns:a="http://schemas.openxmlformats.org/drawingml/2006/main" xmlns:r="http://schemas.openxmlformats.org/officeDocument/2006/relationships" xmlns:p="http://schemas.openxmlformats.org/presentationml/2006/main">
-  <p:cSld>
-    <p:spTree>
-      <p:nvGrpSpPr>
-        <p:cNvPr id="1" name=""/>
-        <p:cNvGrpSpPr/>
-        <p:nvPr/>
-      </p:nvGrpSpPr>
-      <p:grpSpPr>
-        <a:xfrm>
-          <a:off x="0" y="0"/>
-          <a:ext cx="0" cy="0"/>
-          <a:chOff x="0" y="0"/>
-          <a:chExt cx="0" cy="0"/>
-        </a:xfrm>
-      </p:grpSpPr>
-      <p:sp>
-        <p:nvSpPr>
-          <p:cNvPr id="6" name="타원 5">
-            <a:extLst>
-              <a:ext uri="{FF2B5EF4-FFF2-40B4-BE49-F238E27FC236}">
-                <a16:creationId xmlns:a16="http://schemas.microsoft.com/office/drawing/2014/main" id="{6109E5B9-341B-23C0-6D0C-CC13C2329AFF}"/>
-              </a:ext>
-            </a:extLst>
-          </p:cNvPr>
-          <p:cNvSpPr/>
-          <p:nvPr/>
-        </p:nvSpPr>
-        <p:spPr>
-          <a:xfrm>
-            <a:off x="6548438" y="1673225"/>
-            <a:ext cx="3381375" cy="3381375"/>
-          </a:xfrm>
-          <a:prstGeom prst="ellipse">
-            <a:avLst/>
-          </a:prstGeom>
-          <a:solidFill>
-            <a:srgbClr val="06DB72"/>
-          </a:solidFill>
-          <a:ln>
-            <a:noFill/>
-          </a:ln>
-        </p:spPr>
-        <p:style>
-          <a:lnRef idx="2">
-            <a:schemeClr val="accent1">
-              <a:shade val="15000"/>
-            </a:schemeClr>
-          </a:lnRef>
-          <a:fillRef idx="1">
-            <a:schemeClr val="accent1"/>
-          </a:fillRef>
-          <a:effectRef idx="0">
-            <a:schemeClr val="accent1"/>
-          </a:effectRef>
-          <a:fontRef idx="minor">
-            <a:schemeClr val="lt1"/>
-          </a:fontRef>
-        </p:style>
-        <p:txBody>
-          <a:bodyPr rtlCol="0" anchor="ctr"/>
-          <a:lstStyle/>
-          <a:p>
-            <a:pPr algn="ctr"/>
-            <a:endParaRPr kumimoji="1" lang="ko-KR" altLang="en-US" dirty="0"/>
-          </a:p>
-        </p:txBody>
-      </p:sp>
-      <p:pic>
-        <p:nvPicPr>
-          <p:cNvPr id="4" name="그림 3">
-            <a:extLst>
-              <a:ext uri="{FF2B5EF4-FFF2-40B4-BE49-F238E27FC236}">
-                <a16:creationId xmlns:a16="http://schemas.microsoft.com/office/drawing/2014/main" id="{4D01E7E1-413F-B705-0CD3-17D4E30EDBA4}"/>
-              </a:ext>
-            </a:extLst>
-          </p:cNvPr>
-          <p:cNvPicPr>
-            <a:picLocks noChangeAspect="1"/>
-          </p:cNvPicPr>
-          <p:nvPr/>
-        </p:nvPicPr>
-        <p:blipFill>
-          <a:blip r:embed="rId2">
-            <a:lum bright="70000" contrast="-70000"/>
-            <a:extLst>
-              <a:ext uri="{BEBA8EAE-BF5A-486C-A8C5-ECC9F3942E4B}">
-                <a14:imgProps xmlns:a14="http://schemas.microsoft.com/office/drawing/2010/main">
-                  <a14:imgLayer r:embed="rId3">
-                    <a14:imgEffect>
-                      <a14:artisticPhotocopy/>
-                    </a14:imgEffect>
-                  </a14:imgLayer>
-                </a14:imgProps>
-              </a:ext>
-            </a:extLst>
-          </a:blip>
-          <a:stretch>
-            <a:fillRect/>
-          </a:stretch>
-        </p:blipFill>
-        <p:spPr>
-          <a:xfrm>
-            <a:off x="1527175" y="1803400"/>
-            <a:ext cx="3251200" cy="3251200"/>
-          </a:xfrm>
-          <a:prstGeom prst="rect">
-            <a:avLst/>
-          </a:prstGeom>
-          <a:solidFill>
-            <a:schemeClr val="tx1"/>
-          </a:solidFill>
-        </p:spPr>
-      </p:pic>
-      <p:pic>
-        <p:nvPicPr>
-          <p:cNvPr id="5" name="그림 4">
-            <a:extLst>
-              <a:ext uri="{FF2B5EF4-FFF2-40B4-BE49-F238E27FC236}">
-                <a16:creationId xmlns:a16="http://schemas.microsoft.com/office/drawing/2014/main" id="{3AAC9233-8689-4786-2DA2-A6F39FD7308B}"/>
-              </a:ext>
-            </a:extLst>
-          </p:cNvPr>
-          <p:cNvPicPr>
-            <a:picLocks noChangeAspect="1"/>
-          </p:cNvPicPr>
-          <p:nvPr/>
-        </p:nvPicPr>
-        <p:blipFill>
-          <a:blip r:embed="rId2">
-            <a:lum bright="70000" contrast="-70000"/>
-            <a:extLst>
-              <a:ext uri="{BEBA8EAE-BF5A-486C-A8C5-ECC9F3942E4B}">
-                <a14:imgProps xmlns:a14="http://schemas.microsoft.com/office/drawing/2010/main">
-                  <a14:imgLayer r:embed="rId3">
-                    <a14:imgEffect>
-                      <a14:artisticPhotocopy/>
-                    </a14:imgEffect>
-                  </a14:imgLayer>
-                </a14:imgProps>
-              </a:ext>
-            </a:extLst>
-          </a:blip>
-          <a:stretch>
-            <a:fillRect/>
-          </a:stretch>
-        </p:blipFill>
-        <p:spPr>
-          <a:xfrm>
-            <a:off x="7142162" y="2266949"/>
-            <a:ext cx="2193926" cy="2193926"/>
-          </a:xfrm>
-          <a:prstGeom prst="rect">
-            <a:avLst/>
-          </a:prstGeom>
-          <a:noFill/>
-        </p:spPr>
-      </p:pic>
-      <p:pic>
-        <p:nvPicPr>
-          <p:cNvPr id="1026" name="Picture 2" descr="What do the icons on the Apple Watch mean? - Coolblue - anything for a smile">
-            <a:extLst>
-              <a:ext uri="{FF2B5EF4-FFF2-40B4-BE49-F238E27FC236}">
-                <a16:creationId xmlns:a16="http://schemas.microsoft.com/office/drawing/2014/main" id="{5E409C04-0A7D-E8BA-7ACC-1AA1F705E327}"/>
-              </a:ext>
-            </a:extLst>
-          </p:cNvPr>
-          <p:cNvPicPr>
-            <a:picLocks noChangeAspect="1" noChangeArrowheads="1"/>
-          </p:cNvPicPr>
-          <p:nvPr/>
-        </p:nvPicPr>
-        <p:blipFill rotWithShape="1">
-          <a:blip r:embed="rId4">
-            <a:extLst>
-              <a:ext uri="{28A0092B-C50C-407E-A947-70E740481C1C}">
-                <a14:useLocalDpi xmlns:a14="http://schemas.microsoft.com/office/drawing/2010/main" val="0"/>
-              </a:ext>
-            </a:extLst>
-          </a:blip>
-          <a:srcRect t="13002" r="44014" b="42389"/>
-          <a:stretch/>
-        </p:blipFill>
-        <p:spPr bwMode="auto">
-          <a:xfrm>
-            <a:off x="-1687711" y="-1157288"/>
-            <a:ext cx="5972572" cy="2679702"/>
-          </a:xfrm>
-          <a:prstGeom prst="rect">
-            <a:avLst/>
-          </a:prstGeom>
-          <a:noFill/>
-          <a:extLst>
-            <a:ext uri="{909E8E84-426E-40DD-AFC4-6F175D3DCCD1}">
-              <a14:hiddenFill xmlns:a14="http://schemas.microsoft.com/office/drawing/2010/main">
-                <a:solidFill>
-                  <a:srgbClr val="FFFFFF"/>
-                </a:solidFill>
-              </a14:hiddenFill>
-            </a:ext>
-          </a:extLst>
-        </p:spPr>
-      </p:pic>
-    </p:spTree>
-    <p:extLst>
-      <p:ext uri="{BB962C8B-B14F-4D97-AF65-F5344CB8AC3E}">
-        <p14:creationId xmlns:p14="http://schemas.microsoft.com/office/powerpoint/2010/main" val="210761983"/>
-      </p:ext>
-    </p:extLst>
-  </p:cSld>
-  <p:clrMapOvr>
-    <a:masterClrMapping/>
-  </p:clrMapOvr>
-</p:sld>
-</file>
-
-<file path=ppt/slides/slide5.xml><?xml version="1.0" encoding="utf-8"?>
+<file path=ppt/slides/slide7.xml><?xml version="1.0" encoding="utf-8"?>
 <p:sld xmlns:a="http://schemas.openxmlformats.org/drawingml/2006/main" xmlns:r="http://schemas.openxmlformats.org/officeDocument/2006/relationships" xmlns:p="http://schemas.openxmlformats.org/presentationml/2006/main">
   <p:cSld>
     <p:spTree>

</xml_diff>